<commit_message>
added to Pin section of presentation
</commit_message>
<xml_diff>
--- a/Alpha_Modules/2 MicroBit_Basics/Vocab/Slides/1 Vocab Basics MicroBit.pptx
+++ b/Alpha_Modules/2 MicroBit_Basics/Vocab/Slides/1 Vocab Basics MicroBit.pptx
@@ -5,10 +5,10 @@
     <p:sldMasterId id="2147483648" r:id="rId4"/>
   </p:sldMasterIdLst>
   <p:notesMasterIdLst>
-    <p:notesMasterId r:id="rId19"/>
+    <p:notesMasterId r:id="rId23"/>
   </p:notesMasterIdLst>
   <p:handoutMasterIdLst>
-    <p:handoutMasterId r:id="rId20"/>
+    <p:handoutMasterId r:id="rId24"/>
   </p:handoutMasterIdLst>
   <p:sldIdLst>
     <p:sldId id="256" r:id="rId5"/>
@@ -22,9 +22,13 @@
     <p:sldId id="264" r:id="rId13"/>
     <p:sldId id="265" r:id="rId14"/>
     <p:sldId id="266" r:id="rId15"/>
-    <p:sldId id="267" r:id="rId16"/>
-    <p:sldId id="268" r:id="rId17"/>
-    <p:sldId id="269" r:id="rId18"/>
+    <p:sldId id="270" r:id="rId16"/>
+    <p:sldId id="271" r:id="rId17"/>
+    <p:sldId id="272" r:id="rId18"/>
+    <p:sldId id="273" r:id="rId19"/>
+    <p:sldId id="267" r:id="rId20"/>
+    <p:sldId id="268" r:id="rId21"/>
+    <p:sldId id="269" r:id="rId22"/>
   </p:sldIdLst>
   <p:sldSz cx="12192000" cy="6858000"/>
   <p:notesSz cx="6858000" cy="9144000"/>
@@ -227,7 +231,7 @@
           <a:p>
             <a:fld id="{762B48F5-BACC-47D6-A0F7-82FBF9C6BC85}" type="datetimeFigureOut">
               <a:rPr lang="en-US"/>
-              <a:t>3/13/2019</a:t>
+              <a:t>4/12/2019</a:t>
             </a:fld>
             <a:endParaRPr/>
           </a:p>
@@ -392,7 +396,7 @@
           <a:p>
             <a:fld id="{0CB1CD00-5424-4675-AB18-2C419B060449}" type="datetimeFigureOut">
               <a:rPr lang="en-US"/>
-              <a:t>3/13/2019</a:t>
+              <a:t>4/12/2019</a:t>
             </a:fld>
             <a:endParaRPr/>
           </a:p>
@@ -877,7 +881,7 @@
   <p:cSld>
     <p:spTree>
       <p:nvGrpSpPr>
-        <p:cNvPr id="1" name="Shape 93"/>
+        <p:cNvPr id="1" name="Shape 87"/>
         <p:cNvGrpSpPr/>
         <p:nvPr/>
       </p:nvGrpSpPr>
@@ -891,7 +895,7 @@
       </p:grpSpPr>
       <p:sp>
         <p:nvSpPr>
-          <p:cNvPr id="94" name="Google Shape;94;p3:notes"/>
+          <p:cNvPr id="88" name="Google Shape;88;p2:notes"/>
           <p:cNvSpPr txBox="1">
             <a:spLocks noGrp="1"/>
           </p:cNvSpPr>
@@ -929,7 +933,7 @@
       </p:sp>
       <p:sp>
         <p:nvSpPr>
-          <p:cNvPr id="95" name="Google Shape;95;p3:notes"/>
+          <p:cNvPr id="89" name="Google Shape;89;p2:notes"/>
           <p:cNvSpPr>
             <a:spLocks noGrp="1" noRot="1" noChangeAspect="1"/>
           </p:cNvSpPr>
@@ -971,7 +975,7 @@
     </p:spTree>
     <p:extLst>
       <p:ext uri="{BB962C8B-B14F-4D97-AF65-F5344CB8AC3E}">
-        <p14:creationId xmlns:p14="http://schemas.microsoft.com/office/powerpoint/2010/main" val="1729920071"/>
+        <p14:creationId xmlns:p14="http://schemas.microsoft.com/office/powerpoint/2010/main" val="946420261"/>
       </p:ext>
     </p:extLst>
   </p:cSld>
@@ -986,7 +990,7 @@
   <p:cSld>
     <p:spTree>
       <p:nvGrpSpPr>
-        <p:cNvPr id="1" name="Shape 102"/>
+        <p:cNvPr id="1" name="Shape 87"/>
         <p:cNvGrpSpPr/>
         <p:nvPr/>
       </p:nvGrpSpPr>
@@ -1000,7 +1004,7 @@
       </p:grpSpPr>
       <p:sp>
         <p:nvSpPr>
-          <p:cNvPr id="103" name="Google Shape;103;p4:notes"/>
+          <p:cNvPr id="88" name="Google Shape;88;p2:notes"/>
           <p:cNvSpPr txBox="1">
             <a:spLocks noGrp="1"/>
           </p:cNvSpPr>
@@ -1038,7 +1042,7 @@
       </p:sp>
       <p:sp>
         <p:nvSpPr>
-          <p:cNvPr id="104" name="Google Shape;104;p4:notes"/>
+          <p:cNvPr id="89" name="Google Shape;89;p2:notes"/>
           <p:cNvSpPr>
             <a:spLocks noGrp="1" noRot="1" noChangeAspect="1"/>
           </p:cNvSpPr>
@@ -1080,6 +1084,442 @@
     </p:spTree>
     <p:extLst>
       <p:ext uri="{BB962C8B-B14F-4D97-AF65-F5344CB8AC3E}">
+        <p14:creationId xmlns:p14="http://schemas.microsoft.com/office/powerpoint/2010/main" val="1880157107"/>
+      </p:ext>
+    </p:extLst>
+  </p:cSld>
+  <p:clrMapOvr>
+    <a:masterClrMapping/>
+  </p:clrMapOvr>
+</p:notes>
+</file>
+
+<file path=ppt/notesSlides/notesSlide5.xml><?xml version="1.0" encoding="utf-8"?>
+<p:notes xmlns:a="http://schemas.openxmlformats.org/drawingml/2006/main" xmlns:r="http://schemas.openxmlformats.org/officeDocument/2006/relationships" xmlns:p="http://schemas.openxmlformats.org/presentationml/2006/main" showMasterSp="0" showMasterPhAnim="0">
+  <p:cSld>
+    <p:spTree>
+      <p:nvGrpSpPr>
+        <p:cNvPr id="1" name="Shape 87"/>
+        <p:cNvGrpSpPr/>
+        <p:nvPr/>
+      </p:nvGrpSpPr>
+      <p:grpSpPr>
+        <a:xfrm>
+          <a:off x="0" y="0"/>
+          <a:ext cx="0" cy="0"/>
+          <a:chOff x="0" y="0"/>
+          <a:chExt cx="0" cy="0"/>
+        </a:xfrm>
+      </p:grpSpPr>
+      <p:sp>
+        <p:nvSpPr>
+          <p:cNvPr id="88" name="Google Shape;88;p2:notes"/>
+          <p:cNvSpPr txBox="1">
+            <a:spLocks noGrp="1"/>
+          </p:cNvSpPr>
+          <p:nvPr>
+            <p:ph type="body" idx="1"/>
+          </p:nvPr>
+        </p:nvSpPr>
+        <p:spPr>
+          <a:xfrm>
+            <a:off x="685800" y="4400550"/>
+            <a:ext cx="5486400" cy="3600450"/>
+          </a:xfrm>
+          <a:prstGeom prst="rect">
+            <a:avLst/>
+          </a:prstGeom>
+        </p:spPr>
+        <p:txBody>
+          <a:bodyPr spcFirstLastPara="1" wrap="square" lIns="91425" tIns="45700" rIns="91425" bIns="45700" anchor="t" anchorCtr="0">
+            <a:noAutofit/>
+          </a:bodyPr>
+          <a:lstStyle/>
+          <a:p>
+            <a:pPr marL="0" lvl="0" indent="0" algn="l" rtl="0">
+              <a:spcBef>
+                <a:spcPts val="0"/>
+              </a:spcBef>
+              <a:spcAft>
+                <a:spcPts val="0"/>
+              </a:spcAft>
+              <a:buNone/>
+            </a:pPr>
+            <a:endParaRPr/>
+          </a:p>
+        </p:txBody>
+      </p:sp>
+      <p:sp>
+        <p:nvSpPr>
+          <p:cNvPr id="89" name="Google Shape;89;p2:notes"/>
+          <p:cNvSpPr>
+            <a:spLocks noGrp="1" noRot="1" noChangeAspect="1"/>
+          </p:cNvSpPr>
+          <p:nvPr>
+            <p:ph type="sldImg" idx="2"/>
+          </p:nvPr>
+        </p:nvSpPr>
+        <p:spPr>
+          <a:xfrm>
+            <a:off x="685800" y="1143000"/>
+            <a:ext cx="5486400" cy="3086100"/>
+          </a:xfrm>
+          <a:custGeom>
+            <a:avLst/>
+            <a:gdLst/>
+            <a:ahLst/>
+            <a:cxnLst/>
+            <a:rect l="l" t="t" r="r" b="b"/>
+            <a:pathLst>
+              <a:path w="120000" h="120000" extrusionOk="0">
+                <a:moveTo>
+                  <a:pt x="0" y="0"/>
+                </a:moveTo>
+                <a:lnTo>
+                  <a:pt x="120000" y="0"/>
+                </a:lnTo>
+                <a:lnTo>
+                  <a:pt x="120000" y="120000"/>
+                </a:lnTo>
+                <a:lnTo>
+                  <a:pt x="0" y="120000"/>
+                </a:lnTo>
+                <a:close/>
+              </a:path>
+            </a:pathLst>
+          </a:custGeom>
+        </p:spPr>
+      </p:sp>
+    </p:spTree>
+    <p:extLst>
+      <p:ext uri="{BB962C8B-B14F-4D97-AF65-F5344CB8AC3E}">
+        <p14:creationId xmlns:p14="http://schemas.microsoft.com/office/powerpoint/2010/main" val="182266662"/>
+      </p:ext>
+    </p:extLst>
+  </p:cSld>
+  <p:clrMapOvr>
+    <a:masterClrMapping/>
+  </p:clrMapOvr>
+</p:notes>
+</file>
+
+<file path=ppt/notesSlides/notesSlide6.xml><?xml version="1.0" encoding="utf-8"?>
+<p:notes xmlns:a="http://schemas.openxmlformats.org/drawingml/2006/main" xmlns:r="http://schemas.openxmlformats.org/officeDocument/2006/relationships" xmlns:p="http://schemas.openxmlformats.org/presentationml/2006/main" showMasterSp="0" showMasterPhAnim="0">
+  <p:cSld>
+    <p:spTree>
+      <p:nvGrpSpPr>
+        <p:cNvPr id="1" name="Shape 87"/>
+        <p:cNvGrpSpPr/>
+        <p:nvPr/>
+      </p:nvGrpSpPr>
+      <p:grpSpPr>
+        <a:xfrm>
+          <a:off x="0" y="0"/>
+          <a:ext cx="0" cy="0"/>
+          <a:chOff x="0" y="0"/>
+          <a:chExt cx="0" cy="0"/>
+        </a:xfrm>
+      </p:grpSpPr>
+      <p:sp>
+        <p:nvSpPr>
+          <p:cNvPr id="88" name="Google Shape;88;p2:notes"/>
+          <p:cNvSpPr txBox="1">
+            <a:spLocks noGrp="1"/>
+          </p:cNvSpPr>
+          <p:nvPr>
+            <p:ph type="body" idx="1"/>
+          </p:nvPr>
+        </p:nvSpPr>
+        <p:spPr>
+          <a:xfrm>
+            <a:off x="685800" y="4400550"/>
+            <a:ext cx="5486400" cy="3600450"/>
+          </a:xfrm>
+          <a:prstGeom prst="rect">
+            <a:avLst/>
+          </a:prstGeom>
+        </p:spPr>
+        <p:txBody>
+          <a:bodyPr spcFirstLastPara="1" wrap="square" lIns="91425" tIns="45700" rIns="91425" bIns="45700" anchor="t" anchorCtr="0">
+            <a:noAutofit/>
+          </a:bodyPr>
+          <a:lstStyle/>
+          <a:p>
+            <a:pPr marL="0" lvl="0" indent="0" algn="l" rtl="0">
+              <a:spcBef>
+                <a:spcPts val="0"/>
+              </a:spcBef>
+              <a:spcAft>
+                <a:spcPts val="0"/>
+              </a:spcAft>
+              <a:buNone/>
+            </a:pPr>
+            <a:endParaRPr/>
+          </a:p>
+        </p:txBody>
+      </p:sp>
+      <p:sp>
+        <p:nvSpPr>
+          <p:cNvPr id="89" name="Google Shape;89;p2:notes"/>
+          <p:cNvSpPr>
+            <a:spLocks noGrp="1" noRot="1" noChangeAspect="1"/>
+          </p:cNvSpPr>
+          <p:nvPr>
+            <p:ph type="sldImg" idx="2"/>
+          </p:nvPr>
+        </p:nvSpPr>
+        <p:spPr>
+          <a:xfrm>
+            <a:off x="685800" y="1143000"/>
+            <a:ext cx="5486400" cy="3086100"/>
+          </a:xfrm>
+          <a:custGeom>
+            <a:avLst/>
+            <a:gdLst/>
+            <a:ahLst/>
+            <a:cxnLst/>
+            <a:rect l="l" t="t" r="r" b="b"/>
+            <a:pathLst>
+              <a:path w="120000" h="120000" extrusionOk="0">
+                <a:moveTo>
+                  <a:pt x="0" y="0"/>
+                </a:moveTo>
+                <a:lnTo>
+                  <a:pt x="120000" y="0"/>
+                </a:lnTo>
+                <a:lnTo>
+                  <a:pt x="120000" y="120000"/>
+                </a:lnTo>
+                <a:lnTo>
+                  <a:pt x="0" y="120000"/>
+                </a:lnTo>
+                <a:close/>
+              </a:path>
+            </a:pathLst>
+          </a:custGeom>
+        </p:spPr>
+      </p:sp>
+    </p:spTree>
+    <p:extLst>
+      <p:ext uri="{BB962C8B-B14F-4D97-AF65-F5344CB8AC3E}">
+        <p14:creationId xmlns:p14="http://schemas.microsoft.com/office/powerpoint/2010/main" val="3592837692"/>
+      </p:ext>
+    </p:extLst>
+  </p:cSld>
+  <p:clrMapOvr>
+    <a:masterClrMapping/>
+  </p:clrMapOvr>
+</p:notes>
+</file>
+
+<file path=ppt/notesSlides/notesSlide7.xml><?xml version="1.0" encoding="utf-8"?>
+<p:notes xmlns:a="http://schemas.openxmlformats.org/drawingml/2006/main" xmlns:r="http://schemas.openxmlformats.org/officeDocument/2006/relationships" xmlns:p="http://schemas.openxmlformats.org/presentationml/2006/main" showMasterSp="0" showMasterPhAnim="0">
+  <p:cSld>
+    <p:spTree>
+      <p:nvGrpSpPr>
+        <p:cNvPr id="1" name="Shape 93"/>
+        <p:cNvGrpSpPr/>
+        <p:nvPr/>
+      </p:nvGrpSpPr>
+      <p:grpSpPr>
+        <a:xfrm>
+          <a:off x="0" y="0"/>
+          <a:ext cx="0" cy="0"/>
+          <a:chOff x="0" y="0"/>
+          <a:chExt cx="0" cy="0"/>
+        </a:xfrm>
+      </p:grpSpPr>
+      <p:sp>
+        <p:nvSpPr>
+          <p:cNvPr id="94" name="Google Shape;94;p3:notes"/>
+          <p:cNvSpPr txBox="1">
+            <a:spLocks noGrp="1"/>
+          </p:cNvSpPr>
+          <p:nvPr>
+            <p:ph type="body" idx="1"/>
+          </p:nvPr>
+        </p:nvSpPr>
+        <p:spPr>
+          <a:xfrm>
+            <a:off x="685800" y="4400550"/>
+            <a:ext cx="5486400" cy="3600450"/>
+          </a:xfrm>
+          <a:prstGeom prst="rect">
+            <a:avLst/>
+          </a:prstGeom>
+        </p:spPr>
+        <p:txBody>
+          <a:bodyPr spcFirstLastPara="1" wrap="square" lIns="91425" tIns="45700" rIns="91425" bIns="45700" anchor="t" anchorCtr="0">
+            <a:noAutofit/>
+          </a:bodyPr>
+          <a:lstStyle/>
+          <a:p>
+            <a:pPr marL="0" lvl="0" indent="0" algn="l" rtl="0">
+              <a:spcBef>
+                <a:spcPts val="0"/>
+              </a:spcBef>
+              <a:spcAft>
+                <a:spcPts val="0"/>
+              </a:spcAft>
+              <a:buNone/>
+            </a:pPr>
+            <a:endParaRPr/>
+          </a:p>
+        </p:txBody>
+      </p:sp>
+      <p:sp>
+        <p:nvSpPr>
+          <p:cNvPr id="95" name="Google Shape;95;p3:notes"/>
+          <p:cNvSpPr>
+            <a:spLocks noGrp="1" noRot="1" noChangeAspect="1"/>
+          </p:cNvSpPr>
+          <p:nvPr>
+            <p:ph type="sldImg" idx="2"/>
+          </p:nvPr>
+        </p:nvSpPr>
+        <p:spPr>
+          <a:xfrm>
+            <a:off x="685800" y="1143000"/>
+            <a:ext cx="5486400" cy="3086100"/>
+          </a:xfrm>
+          <a:custGeom>
+            <a:avLst/>
+            <a:gdLst/>
+            <a:ahLst/>
+            <a:cxnLst/>
+            <a:rect l="l" t="t" r="r" b="b"/>
+            <a:pathLst>
+              <a:path w="120000" h="120000" extrusionOk="0">
+                <a:moveTo>
+                  <a:pt x="0" y="0"/>
+                </a:moveTo>
+                <a:lnTo>
+                  <a:pt x="120000" y="0"/>
+                </a:lnTo>
+                <a:lnTo>
+                  <a:pt x="120000" y="120000"/>
+                </a:lnTo>
+                <a:lnTo>
+                  <a:pt x="0" y="120000"/>
+                </a:lnTo>
+                <a:close/>
+              </a:path>
+            </a:pathLst>
+          </a:custGeom>
+        </p:spPr>
+      </p:sp>
+    </p:spTree>
+    <p:extLst>
+      <p:ext uri="{BB962C8B-B14F-4D97-AF65-F5344CB8AC3E}">
+        <p14:creationId xmlns:p14="http://schemas.microsoft.com/office/powerpoint/2010/main" val="1729920071"/>
+      </p:ext>
+    </p:extLst>
+  </p:cSld>
+  <p:clrMapOvr>
+    <a:masterClrMapping/>
+  </p:clrMapOvr>
+</p:notes>
+</file>
+
+<file path=ppt/notesSlides/notesSlide8.xml><?xml version="1.0" encoding="utf-8"?>
+<p:notes xmlns:a="http://schemas.openxmlformats.org/drawingml/2006/main" xmlns:r="http://schemas.openxmlformats.org/officeDocument/2006/relationships" xmlns:p="http://schemas.openxmlformats.org/presentationml/2006/main" showMasterSp="0" showMasterPhAnim="0">
+  <p:cSld>
+    <p:spTree>
+      <p:nvGrpSpPr>
+        <p:cNvPr id="1" name="Shape 102"/>
+        <p:cNvGrpSpPr/>
+        <p:nvPr/>
+      </p:nvGrpSpPr>
+      <p:grpSpPr>
+        <a:xfrm>
+          <a:off x="0" y="0"/>
+          <a:ext cx="0" cy="0"/>
+          <a:chOff x="0" y="0"/>
+          <a:chExt cx="0" cy="0"/>
+        </a:xfrm>
+      </p:grpSpPr>
+      <p:sp>
+        <p:nvSpPr>
+          <p:cNvPr id="103" name="Google Shape;103;p4:notes"/>
+          <p:cNvSpPr txBox="1">
+            <a:spLocks noGrp="1"/>
+          </p:cNvSpPr>
+          <p:nvPr>
+            <p:ph type="body" idx="1"/>
+          </p:nvPr>
+        </p:nvSpPr>
+        <p:spPr>
+          <a:xfrm>
+            <a:off x="685800" y="4400550"/>
+            <a:ext cx="5486400" cy="3600450"/>
+          </a:xfrm>
+          <a:prstGeom prst="rect">
+            <a:avLst/>
+          </a:prstGeom>
+        </p:spPr>
+        <p:txBody>
+          <a:bodyPr spcFirstLastPara="1" wrap="square" lIns="91425" tIns="45700" rIns="91425" bIns="45700" anchor="t" anchorCtr="0">
+            <a:noAutofit/>
+          </a:bodyPr>
+          <a:lstStyle/>
+          <a:p>
+            <a:pPr marL="0" lvl="0" indent="0" algn="l" rtl="0">
+              <a:spcBef>
+                <a:spcPts val="0"/>
+              </a:spcBef>
+              <a:spcAft>
+                <a:spcPts val="0"/>
+              </a:spcAft>
+              <a:buNone/>
+            </a:pPr>
+            <a:endParaRPr/>
+          </a:p>
+        </p:txBody>
+      </p:sp>
+      <p:sp>
+        <p:nvSpPr>
+          <p:cNvPr id="104" name="Google Shape;104;p4:notes"/>
+          <p:cNvSpPr>
+            <a:spLocks noGrp="1" noRot="1" noChangeAspect="1"/>
+          </p:cNvSpPr>
+          <p:nvPr>
+            <p:ph type="sldImg" idx="2"/>
+          </p:nvPr>
+        </p:nvSpPr>
+        <p:spPr>
+          <a:xfrm>
+            <a:off x="685800" y="1143000"/>
+            <a:ext cx="5486400" cy="3086100"/>
+          </a:xfrm>
+          <a:custGeom>
+            <a:avLst/>
+            <a:gdLst/>
+            <a:ahLst/>
+            <a:cxnLst/>
+            <a:rect l="l" t="t" r="r" b="b"/>
+            <a:pathLst>
+              <a:path w="120000" h="120000" extrusionOk="0">
+                <a:moveTo>
+                  <a:pt x="0" y="0"/>
+                </a:moveTo>
+                <a:lnTo>
+                  <a:pt x="120000" y="0"/>
+                </a:lnTo>
+                <a:lnTo>
+                  <a:pt x="120000" y="120000"/>
+                </a:lnTo>
+                <a:lnTo>
+                  <a:pt x="0" y="120000"/>
+                </a:lnTo>
+                <a:close/>
+              </a:path>
+            </a:pathLst>
+          </a:custGeom>
+        </p:spPr>
+      </p:sp>
+    </p:spTree>
+    <p:extLst>
+      <p:ext uri="{BB962C8B-B14F-4D97-AF65-F5344CB8AC3E}">
         <p14:creationId xmlns:p14="http://schemas.microsoft.com/office/powerpoint/2010/main" val="2352537381"/>
       </p:ext>
     </p:extLst>
@@ -1090,7 +1530,7 @@
 </p:notes>
 </file>
 
-<file path=ppt/notesSlides/notesSlide5.xml><?xml version="1.0" encoding="utf-8"?>
+<file path=ppt/notesSlides/notesSlide9.xml><?xml version="1.0" encoding="utf-8"?>
 <p:notes xmlns:a="http://schemas.openxmlformats.org/drawingml/2006/main" xmlns:r="http://schemas.openxmlformats.org/officeDocument/2006/relationships" xmlns:p="http://schemas.openxmlformats.org/presentationml/2006/main" showMasterSp="0" showMasterPhAnim="0">
   <p:cSld>
     <p:spTree>
@@ -1582,7 +2022,7 @@
           <a:p>
             <a:fld id="{37CC0096-1860-4642-9CD2-0079EA5E7CD1}" type="datetimeFigureOut">
               <a:rPr lang="en-US" smtClean="0"/>
-              <a:t>3/13/2019</a:t>
+              <a:t>4/12/2019</a:t>
             </a:fld>
             <a:endParaRPr lang="en-US"/>
           </a:p>
@@ -1761,7 +2201,7 @@
           <a:p>
             <a:fld id="{37CC0096-1860-4642-9CD2-0079EA5E7CD1}" type="datetimeFigureOut">
               <a:rPr lang="en-US" smtClean="0"/>
-              <a:t>3/13/2019</a:t>
+              <a:t>4/12/2019</a:t>
             </a:fld>
             <a:endParaRPr lang="en-US"/>
           </a:p>
@@ -1934,7 +2374,7 @@
           <a:p>
             <a:fld id="{37CC0096-1860-4642-9CD2-0079EA5E7CD1}" type="datetimeFigureOut">
               <a:rPr lang="en-US" smtClean="0"/>
-              <a:t>3/13/2019</a:t>
+              <a:t>4/12/2019</a:t>
             </a:fld>
             <a:endParaRPr lang="en-US"/>
           </a:p>
@@ -2367,7 +2807,7 @@
           <a:p>
             <a:fld id="{37CC0096-1860-4642-9CD2-0079EA5E7CD1}" type="datetimeFigureOut">
               <a:rPr lang="en-US" smtClean="0"/>
-              <a:t>3/13/2019</a:t>
+              <a:t>4/12/2019</a:t>
             </a:fld>
             <a:endParaRPr lang="en-US"/>
           </a:p>
@@ -2806,7 +3246,7 @@
           <a:p>
             <a:fld id="{37CC0096-1860-4642-9CD2-0079EA5E7CD1}" type="datetimeFigureOut">
               <a:rPr lang="en-US" smtClean="0"/>
-              <a:t>3/13/2019</a:t>
+              <a:t>4/12/2019</a:t>
             </a:fld>
             <a:endParaRPr lang="en-US"/>
           </a:p>
@@ -2923,7 +3363,7 @@
           <a:p>
             <a:fld id="{37CC0096-1860-4642-9CD2-0079EA5E7CD1}" type="datetimeFigureOut">
               <a:rPr lang="en-US" smtClean="0"/>
-              <a:t>3/13/2019</a:t>
+              <a:t>4/12/2019</a:t>
             </a:fld>
             <a:endParaRPr lang="en-US"/>
           </a:p>
@@ -3018,7 +3458,7 @@
           <a:p>
             <a:fld id="{37CC0096-1860-4642-9CD2-0079EA5E7CD1}" type="datetimeFigureOut">
               <a:rPr lang="en-US" smtClean="0"/>
-              <a:t>3/13/2019</a:t>
+              <a:t>4/12/2019</a:t>
             </a:fld>
             <a:endParaRPr lang="en-US"/>
           </a:p>
@@ -3302,7 +3742,7 @@
           <a:p>
             <a:fld id="{37CC0096-1860-4642-9CD2-0079EA5E7CD1}" type="datetimeFigureOut">
               <a:rPr lang="en-US" smtClean="0"/>
-              <a:t>3/13/2019</a:t>
+              <a:t>4/12/2019</a:t>
             </a:fld>
             <a:endParaRPr lang="en-US"/>
           </a:p>
@@ -3613,7 +4053,7 @@
           <a:p>
             <a:fld id="{37CC0096-1860-4642-9CD2-0079EA5E7CD1}" type="datetimeFigureOut">
               <a:rPr lang="en-US" smtClean="0"/>
-              <a:t>3/13/2019</a:t>
+              <a:t>4/12/2019</a:t>
             </a:fld>
             <a:endParaRPr lang="en-US"/>
           </a:p>
@@ -3845,7 +4285,7 @@
             <a:fld id="{37CC0096-1860-4642-9CD2-0079EA5E7CD1}" type="datetimeFigureOut">
               <a:rPr lang="en-US" smtClean="0"/>
               <a:pPr/>
-              <a:t>3/13/2019</a:t>
+              <a:t>4/12/2019</a:t>
             </a:fld>
             <a:endParaRPr lang="en-US"/>
           </a:p>
@@ -4578,34 +5018,26 @@
               <a:buNone/>
             </a:pPr>
             <a:r>
-              <a:rPr lang="en-US"/>
-              <a:t>I/O stands for input and output. This is how you will interface with your Micro:Bit. One way you can input information to the Micro:Bit  is through Pins.  </a:t>
-            </a:r>
-            <a:r>
-              <a:rPr lang="en-US">
-                <a:solidFill>
-                  <a:srgbClr val="FF0000"/>
-                </a:solidFill>
-              </a:rPr>
-              <a:t>(Go through with the team and change to something more descriptive) (Maybe add a slide about the GND pin)</a:t>
-            </a:r>
-            <a:endParaRPr/>
-          </a:p>
-          <a:p>
-            <a:pPr marL="0" lvl="0" indent="0" algn="l" rtl="0">
-              <a:lnSpc>
-                <a:spcPct val="80000"/>
-              </a:lnSpc>
-              <a:spcBef>
-                <a:spcPts val="1800"/>
-              </a:spcBef>
-              <a:spcAft>
-                <a:spcPts val="0"/>
-              </a:spcAft>
-              <a:buSzPts val="2000"/>
-              <a:buNone/>
-            </a:pPr>
-            <a:endParaRPr>
+              <a:rPr lang="en-US" dirty="0"/>
+              <a:t>I/O stands for input and output. This is how you will interface with your </a:t>
+            </a:r>
+            <a:r>
+              <a:rPr lang="en-US" dirty="0" err="1"/>
+              <a:t>Micro:Bit</a:t>
+            </a:r>
+            <a:r>
+              <a:rPr lang="en-US" dirty="0"/>
+              <a:t>. One way you can input information to the </a:t>
+            </a:r>
+            <a:r>
+              <a:rPr lang="en-US" dirty="0" err="1"/>
+              <a:t>Micro:Bit</a:t>
+            </a:r>
+            <a:r>
+              <a:rPr lang="en-US" dirty="0"/>
+              <a:t>  is through Pins. </a:t>
+            </a:r>
+            <a:endParaRPr dirty="0">
               <a:solidFill>
                 <a:schemeClr val="accent5"/>
               </a:solidFill>
@@ -4631,6 +5063,1178 @@
   <p:cSld>
     <p:spTree>
       <p:nvGrpSpPr>
+        <p:cNvPr id="1" name="Shape 90"/>
+        <p:cNvGrpSpPr/>
+        <p:nvPr/>
+      </p:nvGrpSpPr>
+      <p:grpSpPr>
+        <a:xfrm>
+          <a:off x="0" y="0"/>
+          <a:ext cx="0" cy="0"/>
+          <a:chOff x="0" y="0"/>
+          <a:chExt cx="0" cy="0"/>
+        </a:xfrm>
+      </p:grpSpPr>
+      <p:sp>
+        <p:nvSpPr>
+          <p:cNvPr id="91" name="Google Shape;91;p14"/>
+          <p:cNvSpPr txBox="1">
+            <a:spLocks noGrp="1"/>
+          </p:cNvSpPr>
+          <p:nvPr>
+            <p:ph type="title"/>
+          </p:nvPr>
+        </p:nvSpPr>
+        <p:spPr>
+          <a:xfrm>
+            <a:off x="1600200" y="2286000"/>
+            <a:ext cx="9144000" cy="1143000"/>
+          </a:xfrm>
+          <a:prstGeom prst="rect">
+            <a:avLst/>
+          </a:prstGeom>
+          <a:noFill/>
+          <a:ln>
+            <a:noFill/>
+          </a:ln>
+        </p:spPr>
+        <p:txBody>
+          <a:bodyPr spcFirstLastPara="1" wrap="square" lIns="91425" tIns="45700" rIns="91425" bIns="45700" anchor="b" anchorCtr="0">
+            <a:noAutofit/>
+          </a:bodyPr>
+          <a:lstStyle/>
+          <a:p>
+            <a:pPr marL="0" lvl="0" indent="0" algn="l" rtl="0">
+              <a:lnSpc>
+                <a:spcPct val="90000"/>
+              </a:lnSpc>
+              <a:spcBef>
+                <a:spcPts val="0"/>
+              </a:spcBef>
+              <a:spcAft>
+                <a:spcPts val="0"/>
+              </a:spcAft>
+              <a:buClr>
+                <a:schemeClr val="accent1"/>
+              </a:buClr>
+              <a:buSzPts val="3400"/>
+              <a:buFont typeface="Consolas"/>
+              <a:buNone/>
+            </a:pPr>
+            <a:r>
+              <a:rPr lang="en-US" dirty="0" smtClean="0"/>
+              <a:t>What are pins?</a:t>
+            </a:r>
+            <a:endParaRPr dirty="0"/>
+          </a:p>
+        </p:txBody>
+      </p:sp>
+      <p:sp>
+        <p:nvSpPr>
+          <p:cNvPr id="4" name="Google Shape;92;p14"/>
+          <p:cNvSpPr txBox="1">
+            <a:spLocks/>
+          </p:cNvSpPr>
+          <p:nvPr/>
+        </p:nvSpPr>
+        <p:spPr>
+          <a:xfrm>
+            <a:off x="1596081" y="3657600"/>
+            <a:ext cx="9144000" cy="1143000"/>
+          </a:xfrm>
+          <a:prstGeom prst="rect">
+            <a:avLst/>
+          </a:prstGeom>
+          <a:noFill/>
+          <a:ln>
+            <a:noFill/>
+          </a:ln>
+        </p:spPr>
+        <p:txBody>
+          <a:bodyPr spcFirstLastPara="1" vert="horz" wrap="square" lIns="91425" tIns="45700" rIns="91425" bIns="45700" rtlCol="0" anchor="t" anchorCtr="0">
+            <a:noAutofit/>
+          </a:bodyPr>
+          <a:lstStyle>
+            <a:lvl1pPr marL="228600" indent="-228600" algn="l" defTabSz="914400" rtl="0" eaLnBrk="1" latinLnBrk="0" hangingPunct="1">
+              <a:lnSpc>
+                <a:spcPct val="90000"/>
+              </a:lnSpc>
+              <a:spcBef>
+                <a:spcPts val="1800"/>
+              </a:spcBef>
+              <a:buClr>
+                <a:schemeClr val="accent1"/>
+              </a:buClr>
+              <a:buFont typeface="Arial" pitchFamily="34" charset="0"/>
+              <a:buChar char="•"/>
+              <a:defRPr sz="2000" kern="1200">
+                <a:solidFill>
+                  <a:schemeClr val="tx1">
+                    <a:lumMod val="85000"/>
+                  </a:schemeClr>
+                </a:solidFill>
+                <a:latin typeface="+mn-lt"/>
+                <a:ea typeface="+mn-ea"/>
+                <a:cs typeface="+mn-cs"/>
+              </a:defRPr>
+            </a:lvl1pPr>
+            <a:lvl2pPr marL="594360" indent="-228600" algn="l" defTabSz="914400" rtl="0" eaLnBrk="1" latinLnBrk="0" hangingPunct="1">
+              <a:lnSpc>
+                <a:spcPct val="90000"/>
+              </a:lnSpc>
+              <a:spcBef>
+                <a:spcPts val="1000"/>
+              </a:spcBef>
+              <a:buClr>
+                <a:schemeClr val="accent1"/>
+              </a:buClr>
+              <a:buFont typeface="Arial" pitchFamily="34" charset="0"/>
+              <a:buChar char="•"/>
+              <a:defRPr sz="1800" kern="1200">
+                <a:solidFill>
+                  <a:schemeClr val="tx1">
+                    <a:lumMod val="85000"/>
+                  </a:schemeClr>
+                </a:solidFill>
+                <a:latin typeface="+mn-lt"/>
+                <a:ea typeface="+mn-ea"/>
+                <a:cs typeface="+mn-cs"/>
+              </a:defRPr>
+            </a:lvl2pPr>
+            <a:lvl3pPr marL="914400" indent="-228600" algn="l" defTabSz="914400" rtl="0" eaLnBrk="1" latinLnBrk="0" hangingPunct="1">
+              <a:lnSpc>
+                <a:spcPct val="90000"/>
+              </a:lnSpc>
+              <a:spcBef>
+                <a:spcPts val="800"/>
+              </a:spcBef>
+              <a:buClr>
+                <a:schemeClr val="accent1"/>
+              </a:buClr>
+              <a:buFont typeface="Arial" pitchFamily="34" charset="0"/>
+              <a:buChar char="•"/>
+              <a:defRPr sz="1600" kern="1200">
+                <a:solidFill>
+                  <a:schemeClr val="tx1">
+                    <a:lumMod val="85000"/>
+                  </a:schemeClr>
+                </a:solidFill>
+                <a:latin typeface="+mn-lt"/>
+                <a:ea typeface="+mn-ea"/>
+                <a:cs typeface="+mn-cs"/>
+              </a:defRPr>
+            </a:lvl3pPr>
+            <a:lvl4pPr marL="1234440" indent="-228600" algn="l" defTabSz="914400" rtl="0" eaLnBrk="1" latinLnBrk="0" hangingPunct="1">
+              <a:lnSpc>
+                <a:spcPct val="90000"/>
+              </a:lnSpc>
+              <a:spcBef>
+                <a:spcPts val="800"/>
+              </a:spcBef>
+              <a:buClr>
+                <a:schemeClr val="accent1"/>
+              </a:buClr>
+              <a:buFont typeface="Arial" pitchFamily="34" charset="0"/>
+              <a:buChar char="•"/>
+              <a:defRPr sz="1400" kern="1200">
+                <a:solidFill>
+                  <a:schemeClr val="tx1">
+                    <a:lumMod val="85000"/>
+                  </a:schemeClr>
+                </a:solidFill>
+                <a:latin typeface="+mn-lt"/>
+                <a:ea typeface="+mn-ea"/>
+                <a:cs typeface="+mn-cs"/>
+              </a:defRPr>
+            </a:lvl4pPr>
+            <a:lvl5pPr marL="1508760" indent="-228600" algn="l" defTabSz="914400" rtl="0" eaLnBrk="1" latinLnBrk="0" hangingPunct="1">
+              <a:lnSpc>
+                <a:spcPct val="90000"/>
+              </a:lnSpc>
+              <a:spcBef>
+                <a:spcPts val="800"/>
+              </a:spcBef>
+              <a:buClr>
+                <a:schemeClr val="accent1"/>
+              </a:buClr>
+              <a:buFont typeface="Arial" pitchFamily="34" charset="0"/>
+              <a:buChar char="•"/>
+              <a:defRPr sz="1400" kern="1200">
+                <a:solidFill>
+                  <a:schemeClr val="tx1">
+                    <a:lumMod val="85000"/>
+                  </a:schemeClr>
+                </a:solidFill>
+                <a:latin typeface="+mn-lt"/>
+                <a:ea typeface="+mn-ea"/>
+                <a:cs typeface="+mn-cs"/>
+              </a:defRPr>
+            </a:lvl5pPr>
+            <a:lvl6pPr marL="1783080" indent="-228600" algn="l" defTabSz="914400" rtl="0" eaLnBrk="1" latinLnBrk="0" hangingPunct="1">
+              <a:lnSpc>
+                <a:spcPct val="90000"/>
+              </a:lnSpc>
+              <a:spcBef>
+                <a:spcPts val="800"/>
+              </a:spcBef>
+              <a:buClr>
+                <a:schemeClr val="accent1"/>
+              </a:buClr>
+              <a:buFont typeface="Arial" pitchFamily="34" charset="0"/>
+              <a:buChar char="•"/>
+              <a:defRPr sz="1400" kern="1200">
+                <a:solidFill>
+                  <a:schemeClr val="tx1"/>
+                </a:solidFill>
+                <a:latin typeface="+mn-lt"/>
+                <a:ea typeface="+mn-ea"/>
+                <a:cs typeface="+mn-cs"/>
+              </a:defRPr>
+            </a:lvl6pPr>
+            <a:lvl7pPr marL="2057400" indent="-228600" algn="l" defTabSz="914400" rtl="0" eaLnBrk="1" latinLnBrk="0" hangingPunct="1">
+              <a:lnSpc>
+                <a:spcPct val="90000"/>
+              </a:lnSpc>
+              <a:spcBef>
+                <a:spcPts val="800"/>
+              </a:spcBef>
+              <a:buClr>
+                <a:schemeClr val="accent1"/>
+              </a:buClr>
+              <a:buFont typeface="Arial" pitchFamily="34" charset="0"/>
+              <a:buChar char="•"/>
+              <a:defRPr sz="1400" kern="1200">
+                <a:solidFill>
+                  <a:schemeClr val="tx1"/>
+                </a:solidFill>
+                <a:latin typeface="+mn-lt"/>
+                <a:ea typeface="+mn-ea"/>
+                <a:cs typeface="+mn-cs"/>
+              </a:defRPr>
+            </a:lvl7pPr>
+            <a:lvl8pPr marL="2331720" indent="-228600" algn="l" defTabSz="914400" rtl="0" eaLnBrk="1" latinLnBrk="0" hangingPunct="1">
+              <a:lnSpc>
+                <a:spcPct val="90000"/>
+              </a:lnSpc>
+              <a:spcBef>
+                <a:spcPts val="800"/>
+              </a:spcBef>
+              <a:buClr>
+                <a:schemeClr val="accent1"/>
+              </a:buClr>
+              <a:buFont typeface="Arial" pitchFamily="34" charset="0"/>
+              <a:buChar char="•"/>
+              <a:defRPr sz="1400" kern="1200">
+                <a:solidFill>
+                  <a:schemeClr val="tx1"/>
+                </a:solidFill>
+                <a:latin typeface="+mn-lt"/>
+                <a:ea typeface="+mn-ea"/>
+                <a:cs typeface="+mn-cs"/>
+              </a:defRPr>
+            </a:lvl8pPr>
+            <a:lvl9pPr marL="2606040" indent="-228600" algn="l" defTabSz="914400" rtl="0" eaLnBrk="1" latinLnBrk="0" hangingPunct="1">
+              <a:lnSpc>
+                <a:spcPct val="90000"/>
+              </a:lnSpc>
+              <a:spcBef>
+                <a:spcPts val="800"/>
+              </a:spcBef>
+              <a:buClr>
+                <a:schemeClr val="accent1"/>
+              </a:buClr>
+              <a:buFont typeface="Arial" pitchFamily="34" charset="0"/>
+              <a:buChar char="•"/>
+              <a:defRPr sz="1400" kern="1200">
+                <a:solidFill>
+                  <a:schemeClr val="tx1"/>
+                </a:solidFill>
+                <a:latin typeface="+mn-lt"/>
+                <a:ea typeface="+mn-ea"/>
+                <a:cs typeface="+mn-cs"/>
+              </a:defRPr>
+            </a:lvl9pPr>
+          </a:lstStyle>
+          <a:p>
+            <a:pPr marL="0" indent="0">
+              <a:lnSpc>
+                <a:spcPct val="80000"/>
+              </a:lnSpc>
+              <a:spcBef>
+                <a:spcPts val="0"/>
+              </a:spcBef>
+              <a:buSzPts val="2000"/>
+              <a:buFont typeface="Arial" pitchFamily="34" charset="0"/>
+              <a:buNone/>
+            </a:pPr>
+            <a:r>
+              <a:rPr lang="en-US" dirty="0" smtClean="0">
+                <a:solidFill>
+                  <a:schemeClr val="tx1"/>
+                </a:solidFill>
+              </a:rPr>
+              <a:t>You can think of a pin like a light switch. It can be either </a:t>
+            </a:r>
+            <a:r>
+              <a:rPr lang="en-US" dirty="0" smtClean="0">
+                <a:solidFill>
+                  <a:srgbClr val="00B050"/>
+                </a:solidFill>
+              </a:rPr>
+              <a:t>ON</a:t>
+            </a:r>
+            <a:r>
+              <a:rPr lang="en-US" dirty="0" smtClean="0">
+                <a:solidFill>
+                  <a:schemeClr val="tx1"/>
+                </a:solidFill>
+              </a:rPr>
+              <a:t> or </a:t>
+            </a:r>
+            <a:r>
+              <a:rPr lang="en-US" dirty="0" smtClean="0">
+                <a:solidFill>
+                  <a:schemeClr val="accent5"/>
+                </a:solidFill>
+              </a:rPr>
+              <a:t>OFF</a:t>
+            </a:r>
+            <a:r>
+              <a:rPr lang="en-US" dirty="0" smtClean="0">
+                <a:solidFill>
+                  <a:schemeClr val="tx1"/>
+                </a:solidFill>
+              </a:rPr>
+              <a:t>.</a:t>
+            </a:r>
+          </a:p>
+          <a:p>
+            <a:pPr marL="0" indent="0">
+              <a:lnSpc>
+                <a:spcPct val="80000"/>
+              </a:lnSpc>
+              <a:spcBef>
+                <a:spcPts val="0"/>
+              </a:spcBef>
+              <a:buSzPts val="2000"/>
+              <a:buFont typeface="Arial" pitchFamily="34" charset="0"/>
+              <a:buNone/>
+            </a:pPr>
+            <a:endParaRPr lang="en-US" dirty="0">
+              <a:solidFill>
+                <a:schemeClr val="tx1"/>
+              </a:solidFill>
+            </a:endParaRPr>
+          </a:p>
+          <a:p>
+            <a:pPr marL="0" indent="0">
+              <a:lnSpc>
+                <a:spcPct val="80000"/>
+              </a:lnSpc>
+              <a:spcBef>
+                <a:spcPts val="0"/>
+              </a:spcBef>
+              <a:buSzPts val="2000"/>
+              <a:buFont typeface="Arial" pitchFamily="34" charset="0"/>
+              <a:buNone/>
+            </a:pPr>
+            <a:r>
+              <a:rPr lang="en-US" dirty="0" smtClean="0">
+                <a:solidFill>
+                  <a:srgbClr val="00B050"/>
+                </a:solidFill>
+              </a:rPr>
+              <a:t>ON</a:t>
+            </a:r>
+            <a:r>
+              <a:rPr lang="en-US" dirty="0" smtClean="0">
+                <a:solidFill>
+                  <a:schemeClr val="tx1"/>
+                </a:solidFill>
+              </a:rPr>
+              <a:t> 	= 	</a:t>
+            </a:r>
+            <a:r>
+              <a:rPr lang="en-US" dirty="0" smtClean="0">
+                <a:solidFill>
+                  <a:srgbClr val="00B050"/>
+                </a:solidFill>
+              </a:rPr>
+              <a:t>1</a:t>
+            </a:r>
+          </a:p>
+          <a:p>
+            <a:pPr marL="0" indent="0">
+              <a:lnSpc>
+                <a:spcPct val="80000"/>
+              </a:lnSpc>
+              <a:spcBef>
+                <a:spcPts val="0"/>
+              </a:spcBef>
+              <a:buSzPts val="2000"/>
+              <a:buFont typeface="Arial" pitchFamily="34" charset="0"/>
+              <a:buNone/>
+            </a:pPr>
+            <a:r>
+              <a:rPr lang="en-US" dirty="0" smtClean="0">
+                <a:solidFill>
+                  <a:srgbClr val="FF0000"/>
+                </a:solidFill>
+              </a:rPr>
+              <a:t>OFF</a:t>
+            </a:r>
+            <a:r>
+              <a:rPr lang="en-US" dirty="0" smtClean="0">
+                <a:solidFill>
+                  <a:schemeClr val="tx1"/>
+                </a:solidFill>
+              </a:rPr>
+              <a:t> 	= 	</a:t>
+            </a:r>
+            <a:r>
+              <a:rPr lang="en-US" dirty="0" smtClean="0">
+                <a:solidFill>
+                  <a:srgbClr val="FF0000"/>
+                </a:solidFill>
+              </a:rPr>
+              <a:t>0 </a:t>
+            </a:r>
+          </a:p>
+          <a:p>
+            <a:pPr marL="0" indent="0">
+              <a:lnSpc>
+                <a:spcPct val="80000"/>
+              </a:lnSpc>
+              <a:spcBef>
+                <a:spcPts val="0"/>
+              </a:spcBef>
+              <a:buSzPts val="2000"/>
+              <a:buFont typeface="Arial" pitchFamily="34" charset="0"/>
+              <a:buNone/>
+            </a:pPr>
+            <a:endParaRPr lang="en-US" dirty="0">
+              <a:solidFill>
+                <a:schemeClr val="tx1"/>
+              </a:solidFill>
+            </a:endParaRPr>
+          </a:p>
+        </p:txBody>
+      </p:sp>
+    </p:spTree>
+    <p:extLst>
+      <p:ext uri="{BB962C8B-B14F-4D97-AF65-F5344CB8AC3E}">
+        <p14:creationId xmlns:p14="http://schemas.microsoft.com/office/powerpoint/2010/main" val="2753043344"/>
+      </p:ext>
+    </p:extLst>
+  </p:cSld>
+  <p:clrMapOvr>
+    <a:masterClrMapping/>
+  </p:clrMapOvr>
+</p:sld>
+</file>
+
+<file path=ppt/slides/slide13.xml><?xml version="1.0" encoding="utf-8"?>
+<p:sld xmlns:a="http://schemas.openxmlformats.org/drawingml/2006/main" xmlns:r="http://schemas.openxmlformats.org/officeDocument/2006/relationships" xmlns:p="http://schemas.openxmlformats.org/presentationml/2006/main">
+  <p:cSld>
+    <p:spTree>
+      <p:nvGrpSpPr>
+        <p:cNvPr id="1" name="Shape 90"/>
+        <p:cNvGrpSpPr/>
+        <p:nvPr/>
+      </p:nvGrpSpPr>
+      <p:grpSpPr>
+        <a:xfrm>
+          <a:off x="0" y="0"/>
+          <a:ext cx="0" cy="0"/>
+          <a:chOff x="0" y="0"/>
+          <a:chExt cx="0" cy="0"/>
+        </a:xfrm>
+      </p:grpSpPr>
+      <p:sp>
+        <p:nvSpPr>
+          <p:cNvPr id="91" name="Google Shape;91;p14"/>
+          <p:cNvSpPr txBox="1">
+            <a:spLocks noGrp="1"/>
+          </p:cNvSpPr>
+          <p:nvPr>
+            <p:ph type="title"/>
+          </p:nvPr>
+        </p:nvSpPr>
+        <p:spPr>
+          <a:xfrm>
+            <a:off x="1600200" y="2286000"/>
+            <a:ext cx="9144000" cy="1143000"/>
+          </a:xfrm>
+          <a:prstGeom prst="rect">
+            <a:avLst/>
+          </a:prstGeom>
+          <a:noFill/>
+          <a:ln>
+            <a:noFill/>
+          </a:ln>
+        </p:spPr>
+        <p:txBody>
+          <a:bodyPr spcFirstLastPara="1" wrap="square" lIns="91425" tIns="45700" rIns="91425" bIns="45700" anchor="b" anchorCtr="0">
+            <a:noAutofit/>
+          </a:bodyPr>
+          <a:lstStyle/>
+          <a:p>
+            <a:pPr marL="0" lvl="0" indent="0" algn="l" rtl="0">
+              <a:lnSpc>
+                <a:spcPct val="90000"/>
+              </a:lnSpc>
+              <a:spcBef>
+                <a:spcPts val="0"/>
+              </a:spcBef>
+              <a:spcAft>
+                <a:spcPts val="0"/>
+              </a:spcAft>
+              <a:buClr>
+                <a:schemeClr val="accent1"/>
+              </a:buClr>
+              <a:buSzPts val="3400"/>
+              <a:buFont typeface="Consolas"/>
+              <a:buNone/>
+            </a:pPr>
+            <a:r>
+              <a:rPr lang="en-US" dirty="0" smtClean="0"/>
+              <a:t>Where are the pins?</a:t>
+            </a:r>
+            <a:endParaRPr dirty="0"/>
+          </a:p>
+        </p:txBody>
+      </p:sp>
+      <p:pic>
+        <p:nvPicPr>
+          <p:cNvPr id="2" name="Picture 1"/>
+          <p:cNvPicPr>
+            <a:picLocks noChangeAspect="1"/>
+          </p:cNvPicPr>
+          <p:nvPr/>
+        </p:nvPicPr>
+        <p:blipFill>
+          <a:blip r:embed="rId3"/>
+          <a:stretch>
+            <a:fillRect/>
+          </a:stretch>
+        </p:blipFill>
+        <p:spPr>
+          <a:xfrm>
+            <a:off x="6934200" y="1752600"/>
+            <a:ext cx="3505200" cy="2886075"/>
+          </a:xfrm>
+          <a:prstGeom prst="rect">
+            <a:avLst/>
+          </a:prstGeom>
+        </p:spPr>
+      </p:pic>
+      <p:sp>
+        <p:nvSpPr>
+          <p:cNvPr id="3" name="Rectangle 2"/>
+          <p:cNvSpPr/>
+          <p:nvPr/>
+        </p:nvSpPr>
+        <p:spPr>
+          <a:xfrm>
+            <a:off x="1600200" y="4101085"/>
+            <a:ext cx="4648200" cy="541046"/>
+          </a:xfrm>
+          <a:prstGeom prst="rect">
+            <a:avLst/>
+          </a:prstGeom>
+        </p:spPr>
+        <p:txBody>
+          <a:bodyPr wrap="square">
+            <a:spAutoFit/>
+          </a:bodyPr>
+          <a:lstStyle/>
+          <a:p>
+            <a:pPr>
+              <a:lnSpc>
+                <a:spcPct val="80000"/>
+              </a:lnSpc>
+              <a:buSzPts val="2000"/>
+            </a:pPr>
+            <a:r>
+              <a:rPr lang="en-US" dirty="0" smtClean="0"/>
+              <a:t>There are 4 main pins on your </a:t>
+            </a:r>
+            <a:r>
+              <a:rPr lang="en-US" dirty="0" err="1" smtClean="0"/>
+              <a:t>Micro:Bit</a:t>
+            </a:r>
+            <a:r>
+              <a:rPr lang="en-US" dirty="0" smtClean="0"/>
+              <a:t>. They are located at the bottom of the machine.</a:t>
+            </a:r>
+            <a:endParaRPr lang="en-US" dirty="0"/>
+          </a:p>
+        </p:txBody>
+      </p:sp>
+      <p:sp>
+        <p:nvSpPr>
+          <p:cNvPr id="5" name="Rectangle 4"/>
+          <p:cNvSpPr/>
+          <p:nvPr/>
+        </p:nvSpPr>
+        <p:spPr>
+          <a:xfrm>
+            <a:off x="6934200" y="4663389"/>
+            <a:ext cx="667170" cy="369332"/>
+          </a:xfrm>
+          <a:prstGeom prst="rect">
+            <a:avLst/>
+          </a:prstGeom>
+        </p:spPr>
+        <p:txBody>
+          <a:bodyPr wrap="none">
+            <a:spAutoFit/>
+          </a:bodyPr>
+          <a:lstStyle/>
+          <a:p>
+            <a:r>
+              <a:rPr lang="en-US" dirty="0" smtClean="0"/>
+              <a:t>Pin 1 </a:t>
+            </a:r>
+            <a:endParaRPr lang="en-US" dirty="0"/>
+          </a:p>
+        </p:txBody>
+      </p:sp>
+      <p:sp>
+        <p:nvSpPr>
+          <p:cNvPr id="8" name="Rectangle 7"/>
+          <p:cNvSpPr/>
+          <p:nvPr/>
+        </p:nvSpPr>
+        <p:spPr>
+          <a:xfrm>
+            <a:off x="7601370" y="4662102"/>
+            <a:ext cx="667170" cy="369332"/>
+          </a:xfrm>
+          <a:prstGeom prst="rect">
+            <a:avLst/>
+          </a:prstGeom>
+        </p:spPr>
+        <p:txBody>
+          <a:bodyPr wrap="none">
+            <a:spAutoFit/>
+          </a:bodyPr>
+          <a:lstStyle/>
+          <a:p>
+            <a:r>
+              <a:rPr lang="en-US" dirty="0" smtClean="0"/>
+              <a:t>Pin 2</a:t>
+            </a:r>
+            <a:endParaRPr lang="en-US" dirty="0"/>
+          </a:p>
+        </p:txBody>
+      </p:sp>
+      <p:sp>
+        <p:nvSpPr>
+          <p:cNvPr id="9" name="Rectangle 8"/>
+          <p:cNvSpPr/>
+          <p:nvPr/>
+        </p:nvSpPr>
+        <p:spPr>
+          <a:xfrm>
+            <a:off x="8353215" y="4662102"/>
+            <a:ext cx="667170" cy="369332"/>
+          </a:xfrm>
+          <a:prstGeom prst="rect">
+            <a:avLst/>
+          </a:prstGeom>
+        </p:spPr>
+        <p:txBody>
+          <a:bodyPr wrap="none">
+            <a:spAutoFit/>
+          </a:bodyPr>
+          <a:lstStyle/>
+          <a:p>
+            <a:r>
+              <a:rPr lang="en-US" dirty="0" smtClean="0"/>
+              <a:t>Pin 3</a:t>
+            </a:r>
+            <a:endParaRPr lang="en-US" dirty="0"/>
+          </a:p>
+        </p:txBody>
+      </p:sp>
+      <p:sp>
+        <p:nvSpPr>
+          <p:cNvPr id="10" name="Rectangle 9"/>
+          <p:cNvSpPr/>
+          <p:nvPr/>
+        </p:nvSpPr>
+        <p:spPr>
+          <a:xfrm>
+            <a:off x="9753600" y="4662874"/>
+            <a:ext cx="1265090" cy="369332"/>
+          </a:xfrm>
+          <a:prstGeom prst="rect">
+            <a:avLst/>
+          </a:prstGeom>
+        </p:spPr>
+        <p:txBody>
+          <a:bodyPr wrap="none">
+            <a:spAutoFit/>
+          </a:bodyPr>
+          <a:lstStyle/>
+          <a:p>
+            <a:r>
+              <a:rPr lang="en-US" dirty="0" smtClean="0"/>
+              <a:t>Ground Pin</a:t>
+            </a:r>
+            <a:endParaRPr lang="en-US" dirty="0"/>
+          </a:p>
+        </p:txBody>
+      </p:sp>
+    </p:spTree>
+    <p:extLst>
+      <p:ext uri="{BB962C8B-B14F-4D97-AF65-F5344CB8AC3E}">
+        <p14:creationId xmlns:p14="http://schemas.microsoft.com/office/powerpoint/2010/main" val="1445545689"/>
+      </p:ext>
+    </p:extLst>
+  </p:cSld>
+  <p:clrMapOvr>
+    <a:masterClrMapping/>
+  </p:clrMapOvr>
+</p:sld>
+</file>
+
+<file path=ppt/slides/slide14.xml><?xml version="1.0" encoding="utf-8"?>
+<p:sld xmlns:a="http://schemas.openxmlformats.org/drawingml/2006/main" xmlns:r="http://schemas.openxmlformats.org/officeDocument/2006/relationships" xmlns:p="http://schemas.openxmlformats.org/presentationml/2006/main">
+  <p:cSld>
+    <p:spTree>
+      <p:nvGrpSpPr>
+        <p:cNvPr id="1" name="Shape 90"/>
+        <p:cNvGrpSpPr/>
+        <p:nvPr/>
+      </p:nvGrpSpPr>
+      <p:grpSpPr>
+        <a:xfrm>
+          <a:off x="0" y="0"/>
+          <a:ext cx="0" cy="0"/>
+          <a:chOff x="0" y="0"/>
+          <a:chExt cx="0" cy="0"/>
+        </a:xfrm>
+      </p:grpSpPr>
+      <p:sp>
+        <p:nvSpPr>
+          <p:cNvPr id="91" name="Google Shape;91;p14"/>
+          <p:cNvSpPr txBox="1">
+            <a:spLocks noGrp="1"/>
+          </p:cNvSpPr>
+          <p:nvPr>
+            <p:ph type="title"/>
+          </p:nvPr>
+        </p:nvSpPr>
+        <p:spPr>
+          <a:xfrm>
+            <a:off x="1600200" y="2286000"/>
+            <a:ext cx="9144000" cy="1143000"/>
+          </a:xfrm>
+          <a:prstGeom prst="rect">
+            <a:avLst/>
+          </a:prstGeom>
+          <a:noFill/>
+          <a:ln>
+            <a:noFill/>
+          </a:ln>
+        </p:spPr>
+        <p:txBody>
+          <a:bodyPr spcFirstLastPara="1" wrap="square" lIns="91425" tIns="45700" rIns="91425" bIns="45700" anchor="b" anchorCtr="0">
+            <a:noAutofit/>
+          </a:bodyPr>
+          <a:lstStyle/>
+          <a:p>
+            <a:pPr marL="0" lvl="0" indent="0" algn="l" rtl="0">
+              <a:lnSpc>
+                <a:spcPct val="90000"/>
+              </a:lnSpc>
+              <a:spcBef>
+                <a:spcPts val="0"/>
+              </a:spcBef>
+              <a:spcAft>
+                <a:spcPts val="0"/>
+              </a:spcAft>
+              <a:buClr>
+                <a:schemeClr val="accent1"/>
+              </a:buClr>
+              <a:buSzPts val="3400"/>
+              <a:buFont typeface="Consolas"/>
+              <a:buNone/>
+            </a:pPr>
+            <a:r>
+              <a:rPr lang="en-US" dirty="0" smtClean="0"/>
+              <a:t>How to use a pin</a:t>
+            </a:r>
+            <a:endParaRPr dirty="0"/>
+          </a:p>
+        </p:txBody>
+      </p:sp>
+      <p:pic>
+        <p:nvPicPr>
+          <p:cNvPr id="2" name="Picture 1"/>
+          <p:cNvPicPr>
+            <a:picLocks noChangeAspect="1"/>
+          </p:cNvPicPr>
+          <p:nvPr/>
+        </p:nvPicPr>
+        <p:blipFill>
+          <a:blip r:embed="rId3"/>
+          <a:stretch>
+            <a:fillRect/>
+          </a:stretch>
+        </p:blipFill>
+        <p:spPr>
+          <a:xfrm>
+            <a:off x="6934200" y="1752600"/>
+            <a:ext cx="3505200" cy="2886075"/>
+          </a:xfrm>
+          <a:prstGeom prst="rect">
+            <a:avLst/>
+          </a:prstGeom>
+        </p:spPr>
+      </p:pic>
+      <p:sp>
+        <p:nvSpPr>
+          <p:cNvPr id="3" name="Rectangle 2"/>
+          <p:cNvSpPr/>
+          <p:nvPr/>
+        </p:nvSpPr>
+        <p:spPr>
+          <a:xfrm>
+            <a:off x="1600200" y="4101085"/>
+            <a:ext cx="4648200" cy="535531"/>
+          </a:xfrm>
+          <a:prstGeom prst="rect">
+            <a:avLst/>
+          </a:prstGeom>
+        </p:spPr>
+        <p:txBody>
+          <a:bodyPr wrap="square">
+            <a:spAutoFit/>
+          </a:bodyPr>
+          <a:lstStyle/>
+          <a:p>
+            <a:pPr>
+              <a:lnSpc>
+                <a:spcPct val="80000"/>
+              </a:lnSpc>
+              <a:buSzPts val="2000"/>
+            </a:pPr>
+            <a:r>
+              <a:rPr lang="en-US" dirty="0"/>
+              <a:t>You can turn a pin </a:t>
+            </a:r>
+            <a:r>
+              <a:rPr lang="en-US" dirty="0">
+                <a:solidFill>
+                  <a:srgbClr val="00B050"/>
+                </a:solidFill>
+              </a:rPr>
+              <a:t>ON</a:t>
+            </a:r>
+            <a:r>
+              <a:rPr lang="en-US" dirty="0"/>
+              <a:t> by holding the </a:t>
+            </a:r>
+            <a:r>
+              <a:rPr lang="en-US" dirty="0">
+                <a:solidFill>
+                  <a:schemeClr val="accent6">
+                    <a:lumMod val="50000"/>
+                  </a:schemeClr>
+                </a:solidFill>
+              </a:rPr>
+              <a:t>GND</a:t>
+            </a:r>
+            <a:r>
+              <a:rPr lang="en-US" dirty="0"/>
+              <a:t> pin and touching either of the three pins.</a:t>
+            </a:r>
+            <a:endParaRPr lang="en-US" dirty="0"/>
+          </a:p>
+        </p:txBody>
+      </p:sp>
+    </p:spTree>
+    <p:extLst>
+      <p:ext uri="{BB962C8B-B14F-4D97-AF65-F5344CB8AC3E}">
+        <p14:creationId xmlns:p14="http://schemas.microsoft.com/office/powerpoint/2010/main" val="542595728"/>
+      </p:ext>
+    </p:extLst>
+  </p:cSld>
+  <p:clrMapOvr>
+    <a:masterClrMapping/>
+  </p:clrMapOvr>
+</p:sld>
+</file>
+
+<file path=ppt/slides/slide15.xml><?xml version="1.0" encoding="utf-8"?>
+<p:sld xmlns:a="http://schemas.openxmlformats.org/drawingml/2006/main" xmlns:r="http://schemas.openxmlformats.org/officeDocument/2006/relationships" xmlns:p="http://schemas.openxmlformats.org/presentationml/2006/main">
+  <p:cSld>
+    <p:spTree>
+      <p:nvGrpSpPr>
+        <p:cNvPr id="1" name="Shape 90"/>
+        <p:cNvGrpSpPr/>
+        <p:nvPr/>
+      </p:nvGrpSpPr>
+      <p:grpSpPr>
+        <a:xfrm>
+          <a:off x="0" y="0"/>
+          <a:ext cx="0" cy="0"/>
+          <a:chOff x="0" y="0"/>
+          <a:chExt cx="0" cy="0"/>
+        </a:xfrm>
+      </p:grpSpPr>
+      <p:sp>
+        <p:nvSpPr>
+          <p:cNvPr id="91" name="Google Shape;91;p14"/>
+          <p:cNvSpPr txBox="1">
+            <a:spLocks noGrp="1"/>
+          </p:cNvSpPr>
+          <p:nvPr>
+            <p:ph type="title"/>
+          </p:nvPr>
+        </p:nvSpPr>
+        <p:spPr>
+          <a:xfrm>
+            <a:off x="1600200" y="2286000"/>
+            <a:ext cx="9144000" cy="1143000"/>
+          </a:xfrm>
+          <a:prstGeom prst="rect">
+            <a:avLst/>
+          </a:prstGeom>
+          <a:noFill/>
+          <a:ln>
+            <a:noFill/>
+          </a:ln>
+        </p:spPr>
+        <p:txBody>
+          <a:bodyPr spcFirstLastPara="1" wrap="square" lIns="91425" tIns="45700" rIns="91425" bIns="45700" anchor="b" anchorCtr="0">
+            <a:noAutofit/>
+          </a:bodyPr>
+          <a:lstStyle/>
+          <a:p>
+            <a:pPr marL="0" lvl="0" indent="0" algn="l" rtl="0">
+              <a:lnSpc>
+                <a:spcPct val="90000"/>
+              </a:lnSpc>
+              <a:spcBef>
+                <a:spcPts val="0"/>
+              </a:spcBef>
+              <a:spcAft>
+                <a:spcPts val="0"/>
+              </a:spcAft>
+              <a:buClr>
+                <a:schemeClr val="accent1"/>
+              </a:buClr>
+              <a:buSzPts val="3400"/>
+              <a:buFont typeface="Consolas"/>
+              <a:buNone/>
+            </a:pPr>
+            <a:r>
+              <a:rPr lang="en-US" dirty="0" smtClean="0"/>
+              <a:t>Change pin 1 to ON</a:t>
+            </a:r>
+            <a:endParaRPr dirty="0"/>
+          </a:p>
+        </p:txBody>
+      </p:sp>
+      <p:pic>
+        <p:nvPicPr>
+          <p:cNvPr id="2" name="Picture 1"/>
+          <p:cNvPicPr>
+            <a:picLocks noChangeAspect="1"/>
+          </p:cNvPicPr>
+          <p:nvPr/>
+        </p:nvPicPr>
+        <p:blipFill>
+          <a:blip r:embed="rId3"/>
+          <a:stretch>
+            <a:fillRect/>
+          </a:stretch>
+        </p:blipFill>
+        <p:spPr>
+          <a:xfrm>
+            <a:off x="6934200" y="1752600"/>
+            <a:ext cx="3505200" cy="2886075"/>
+          </a:xfrm>
+          <a:prstGeom prst="rect">
+            <a:avLst/>
+          </a:prstGeom>
+        </p:spPr>
+      </p:pic>
+      <p:sp>
+        <p:nvSpPr>
+          <p:cNvPr id="3" name="Rectangle 2"/>
+          <p:cNvSpPr/>
+          <p:nvPr/>
+        </p:nvSpPr>
+        <p:spPr>
+          <a:xfrm>
+            <a:off x="1600200" y="4101085"/>
+            <a:ext cx="4648200" cy="541046"/>
+          </a:xfrm>
+          <a:prstGeom prst="rect">
+            <a:avLst/>
+          </a:prstGeom>
+        </p:spPr>
+        <p:txBody>
+          <a:bodyPr wrap="square">
+            <a:spAutoFit/>
+          </a:bodyPr>
+          <a:lstStyle/>
+          <a:p>
+            <a:pPr>
+              <a:lnSpc>
+                <a:spcPct val="80000"/>
+              </a:lnSpc>
+              <a:buSzPts val="2000"/>
+            </a:pPr>
+            <a:r>
+              <a:rPr lang="en-US" dirty="0"/>
+              <a:t>You can </a:t>
+            </a:r>
+            <a:r>
+              <a:rPr lang="en-US" dirty="0" smtClean="0"/>
+              <a:t>turn pin 1 </a:t>
+            </a:r>
+            <a:r>
+              <a:rPr lang="en-US" dirty="0" smtClean="0">
+                <a:solidFill>
+                  <a:srgbClr val="00B050"/>
+                </a:solidFill>
+              </a:rPr>
+              <a:t>ON</a:t>
+            </a:r>
+            <a:r>
+              <a:rPr lang="en-US" dirty="0" smtClean="0"/>
+              <a:t> </a:t>
+            </a:r>
+            <a:r>
+              <a:rPr lang="en-US" dirty="0"/>
+              <a:t>by holding the </a:t>
+            </a:r>
+            <a:r>
+              <a:rPr lang="en-US" dirty="0">
+                <a:solidFill>
+                  <a:schemeClr val="accent6">
+                    <a:lumMod val="50000"/>
+                  </a:schemeClr>
+                </a:solidFill>
+              </a:rPr>
+              <a:t>GND</a:t>
+            </a:r>
+            <a:r>
+              <a:rPr lang="en-US" dirty="0"/>
+              <a:t> pin and touching </a:t>
+            </a:r>
+            <a:r>
+              <a:rPr lang="en-US" dirty="0" smtClean="0"/>
+              <a:t>pin number 1.</a:t>
+            </a:r>
+            <a:endParaRPr lang="en-US" dirty="0"/>
+          </a:p>
+        </p:txBody>
+      </p:sp>
+      <p:sp>
+        <p:nvSpPr>
+          <p:cNvPr id="4" name="Down Arrow 3"/>
+          <p:cNvSpPr/>
+          <p:nvPr/>
+        </p:nvSpPr>
+        <p:spPr>
+          <a:xfrm rot="10800000">
+            <a:off x="7010400" y="4746117"/>
+            <a:ext cx="381000" cy="457200"/>
+          </a:xfrm>
+          <a:prstGeom prst="downArrow">
+            <a:avLst/>
+          </a:prstGeom>
+        </p:spPr>
+        <p:style>
+          <a:lnRef idx="2">
+            <a:schemeClr val="accent1">
+              <a:shade val="50000"/>
+            </a:schemeClr>
+          </a:lnRef>
+          <a:fillRef idx="1">
+            <a:schemeClr val="accent1"/>
+          </a:fillRef>
+          <a:effectRef idx="0">
+            <a:schemeClr val="accent1"/>
+          </a:effectRef>
+          <a:fontRef idx="minor">
+            <a:schemeClr val="lt1"/>
+          </a:fontRef>
+        </p:style>
+        <p:txBody>
+          <a:bodyPr rtlCol="0" anchor="ctr"/>
+          <a:lstStyle/>
+          <a:p>
+            <a:pPr algn="ctr"/>
+            <a:endParaRPr lang="en-US"/>
+          </a:p>
+        </p:txBody>
+      </p:sp>
+      <p:sp>
+        <p:nvSpPr>
+          <p:cNvPr id="6" name="Down Arrow 5"/>
+          <p:cNvSpPr/>
+          <p:nvPr/>
+        </p:nvSpPr>
+        <p:spPr>
+          <a:xfrm rot="10800000">
+            <a:off x="9982200" y="4746118"/>
+            <a:ext cx="381000" cy="457200"/>
+          </a:xfrm>
+          <a:prstGeom prst="downArrow">
+            <a:avLst/>
+          </a:prstGeom>
+        </p:spPr>
+        <p:style>
+          <a:lnRef idx="2">
+            <a:schemeClr val="accent1">
+              <a:shade val="50000"/>
+            </a:schemeClr>
+          </a:lnRef>
+          <a:fillRef idx="1">
+            <a:schemeClr val="accent1"/>
+          </a:fillRef>
+          <a:effectRef idx="0">
+            <a:schemeClr val="accent1"/>
+          </a:effectRef>
+          <a:fontRef idx="minor">
+            <a:schemeClr val="lt1"/>
+          </a:fontRef>
+        </p:style>
+        <p:txBody>
+          <a:bodyPr rtlCol="0" anchor="ctr"/>
+          <a:lstStyle/>
+          <a:p>
+            <a:pPr algn="ctr"/>
+            <a:endParaRPr lang="en-US"/>
+          </a:p>
+        </p:txBody>
+      </p:sp>
+    </p:spTree>
+    <p:extLst>
+      <p:ext uri="{BB962C8B-B14F-4D97-AF65-F5344CB8AC3E}">
+        <p14:creationId xmlns:p14="http://schemas.microsoft.com/office/powerpoint/2010/main" val="4294425833"/>
+      </p:ext>
+    </p:extLst>
+  </p:cSld>
+  <p:clrMapOvr>
+    <a:masterClrMapping/>
+  </p:clrMapOvr>
+</p:sld>
+</file>
+
+<file path=ppt/slides/slide16.xml><?xml version="1.0" encoding="utf-8"?>
+<p:sld xmlns:a="http://schemas.openxmlformats.org/drawingml/2006/main" xmlns:r="http://schemas.openxmlformats.org/officeDocument/2006/relationships" xmlns:p="http://schemas.openxmlformats.org/presentationml/2006/main">
+  <p:cSld>
+    <p:spTree>
+      <p:nvGrpSpPr>
         <p:cNvPr id="1" name="Shape 96"/>
         <p:cNvGrpSpPr/>
         <p:nvPr/>
@@ -4690,80 +6294,10 @@
               <a:buNone/>
             </a:pPr>
             <a:r>
-              <a:rPr lang="en-US"/>
-              <a:t>Pin 0</a:t>
-            </a:r>
-            <a:endParaRPr/>
-          </a:p>
-        </p:txBody>
-      </p:sp>
-      <p:sp>
-        <p:nvSpPr>
-          <p:cNvPr id="98" name="Google Shape;98;p15"/>
-          <p:cNvSpPr txBox="1">
-            <a:spLocks noGrp="1"/>
-          </p:cNvSpPr>
-          <p:nvPr>
-            <p:ph type="body" idx="1"/>
-          </p:nvPr>
-        </p:nvSpPr>
-        <p:spPr>
-          <a:xfrm>
-            <a:off x="1524000" y="1828800"/>
-            <a:ext cx="9144000" cy="1143000"/>
-          </a:xfrm>
-          <a:prstGeom prst="rect">
-            <a:avLst/>
-          </a:prstGeom>
-          <a:noFill/>
-          <a:ln>
-            <a:noFill/>
-          </a:ln>
-        </p:spPr>
-        <p:txBody>
-          <a:bodyPr spcFirstLastPara="1" wrap="square" lIns="91425" tIns="45700" rIns="91425" bIns="45700" anchor="t" anchorCtr="0">
-            <a:noAutofit/>
-          </a:bodyPr>
-          <a:lstStyle/>
-          <a:p>
-            <a:pPr marL="0" lvl="0" indent="0" algn="l" rtl="0">
-              <a:lnSpc>
-                <a:spcPct val="90000"/>
-              </a:lnSpc>
-              <a:spcBef>
-                <a:spcPts val="0"/>
-              </a:spcBef>
-              <a:spcAft>
-                <a:spcPts val="0"/>
-              </a:spcAft>
-              <a:buSzPts val="2000"/>
-              <a:buNone/>
-            </a:pPr>
-            <a:r>
-              <a:rPr lang="en-US"/>
-              <a:t>I/O stands for input and output. This is how you will interface with your Micro:Bit. One way you can input information to the Micro:Bit  is through Pins. </a:t>
-            </a:r>
-            <a:endParaRPr/>
-          </a:p>
-          <a:p>
-            <a:pPr marL="0" lvl="0" indent="0" algn="l" rtl="0">
-              <a:lnSpc>
-                <a:spcPct val="90000"/>
-              </a:lnSpc>
-              <a:spcBef>
-                <a:spcPts val="1800"/>
-              </a:spcBef>
-              <a:spcAft>
-                <a:spcPts val="0"/>
-              </a:spcAft>
-              <a:buSzPts val="2000"/>
-              <a:buNone/>
-            </a:pPr>
-            <a:endParaRPr>
-              <a:solidFill>
-                <a:schemeClr val="accent5"/>
-              </a:solidFill>
-            </a:endParaRPr>
+              <a:rPr lang="en-US" dirty="0" smtClean="0"/>
+              <a:t>Pin 0 code</a:t>
+            </a:r>
+            <a:endParaRPr dirty="0"/>
           </a:p>
         </p:txBody>
       </p:sp>
@@ -5020,7 +6554,7 @@
 </p:sld>
 </file>
 
-<file path=ppt/slides/slide13.xml><?xml version="1.0" encoding="utf-8"?>
+<file path=ppt/slides/slide17.xml><?xml version="1.0" encoding="utf-8"?>
 <p:sld xmlns:a="http://schemas.openxmlformats.org/drawingml/2006/main" xmlns:r="http://schemas.openxmlformats.org/officeDocument/2006/relationships" xmlns:p="http://schemas.openxmlformats.org/presentationml/2006/main">
   <p:cSld>
     <p:spTree>
@@ -5238,10 +6772,14 @@
               <a:buNone/>
             </a:pPr>
             <a:r>
-              <a:rPr lang="en-US"/>
-              <a:t>Pin 1</a:t>
-            </a:r>
-            <a:endParaRPr/>
+              <a:rPr lang="en-US" dirty="0"/>
+              <a:t>Pin </a:t>
+            </a:r>
+            <a:r>
+              <a:rPr lang="en-US" dirty="0" smtClean="0"/>
+              <a:t>1 code</a:t>
+            </a:r>
+            <a:endParaRPr dirty="0"/>
           </a:p>
         </p:txBody>
       </p:sp>
@@ -5344,7 +6882,7 @@
 </p:sld>
 </file>
 
-<file path=ppt/slides/slide14.xml><?xml version="1.0" encoding="utf-8"?>
+<file path=ppt/slides/slide18.xml><?xml version="1.0" encoding="utf-8"?>
 <p:sld xmlns:a="http://schemas.openxmlformats.org/drawingml/2006/main" xmlns:r="http://schemas.openxmlformats.org/officeDocument/2006/relationships" xmlns:p="http://schemas.openxmlformats.org/presentationml/2006/main">
   <p:cSld>
     <p:spTree>
@@ -5408,10 +6946,14 @@
               <a:buNone/>
             </a:pPr>
             <a:r>
-              <a:rPr lang="en-US"/>
-              <a:t>Pin 2</a:t>
-            </a:r>
-            <a:endParaRPr/>
+              <a:rPr lang="en-US" dirty="0"/>
+              <a:t>Pin </a:t>
+            </a:r>
+            <a:r>
+              <a:rPr lang="en-US" dirty="0" smtClean="0"/>
+              <a:t>2 code</a:t>
+            </a:r>
+            <a:endParaRPr dirty="0"/>
           </a:p>
         </p:txBody>
       </p:sp>
@@ -10627,6 +12169,15 @@
 </file>
 
 <file path=customXml/item2.xml><?xml version="1.0" encoding="utf-8"?>
+<?mso-contentType ?>
+<FormTemplates xmlns="http://schemas.microsoft.com/sharepoint/v3/contenttype/forms">
+  <Display>DocumentLibraryForm</Display>
+  <Edit>AssetEditForm</Edit>
+  <New>DocumentLibraryForm</New>
+</FormTemplates>
+</file>
+
+<file path=customXml/item3.xml><?xml version="1.0" encoding="utf-8"?>
 <ct:contentTypeSchema xmlns:ct="http://schemas.microsoft.com/office/2006/metadata/contentType" xmlns:ma="http://schemas.microsoft.com/office/2006/metadata/properties/metaAttributes" ct:_="" ma:_="" ma:contentTypeName="TemplateFile" ma:contentTypeID="0x0101006EDDDB5EE6D98C44930B742096920B300400F5B6D36B3EF94B4E9A635CDF2A18F5B8" ma:contentTypeVersion="72" ma:contentTypeDescription="Create a new document." ma:contentTypeScope="" ma:versionID="a23e56308344d904b51738559c3d67c9">
   <xsd:schema xmlns:xsd="http://www.w3.org/2001/XMLSchema" xmlns:xs="http://www.w3.org/2001/XMLSchema" xmlns:p="http://schemas.microsoft.com/office/2006/metadata/properties" xmlns:ns2="4873beb7-5857-4685-be1f-d57550cc96cc" targetNamespace="http://schemas.microsoft.com/office/2006/metadata/properties" ma:root="true" ma:fieldsID="cd0908cc4600e77bf5da051303e00c8d" ns2:_="">
     <xsd:import namespace="4873beb7-5857-4685-be1f-d57550cc96cc"/>
@@ -11666,15 +13217,6 @@
 </ct:contentTypeSchema>
 </file>
 
-<file path=customXml/item3.xml><?xml version="1.0" encoding="utf-8"?>
-<?mso-contentType ?>
-<FormTemplates xmlns="http://schemas.microsoft.com/sharepoint/v3/contenttype/forms">
-  <Display>DocumentLibraryForm</Display>
-  <Edit>AssetEditForm</Edit>
-  <New>DocumentLibraryForm</New>
-</FormTemplates>
-</file>
-
 <file path=customXml/itemProps1.xml><?xml version="1.0" encoding="utf-8"?>
 <ds:datastoreItem xmlns:ds="http://schemas.openxmlformats.org/officeDocument/2006/customXml" ds:itemID="{04098515-0C12-46CF-BC7C-69B4A13CD5FA}">
   <ds:schemaRefs>
@@ -11692,6 +13234,14 @@
 </file>
 
 <file path=customXml/itemProps2.xml><?xml version="1.0" encoding="utf-8"?>
+<ds:datastoreItem xmlns:ds="http://schemas.openxmlformats.org/officeDocument/2006/customXml" ds:itemID="{746CFF6F-D9AA-4BC0-911A-0A1356771912}">
+  <ds:schemaRefs>
+    <ds:schemaRef ds:uri="http://schemas.microsoft.com/sharepoint/v3/contenttype/forms"/>
+  </ds:schemaRefs>
+</ds:datastoreItem>
+</file>
+
+<file path=customXml/itemProps3.xml><?xml version="1.0" encoding="utf-8"?>
 <ds:datastoreItem xmlns:ds="http://schemas.openxmlformats.org/officeDocument/2006/customXml" ds:itemID="{0B5C6E15-39DC-470B-9445-F754B9458020}">
   <ds:schemaRefs>
     <ds:schemaRef ds:uri="http://schemas.microsoft.com/office/2006/metadata/contentType"/>
@@ -11707,12 +13257,4 @@
     <ds:schemaRef ds:uri="http://schemas.microsoft.com/internal/obd"/>
   </ds:schemaRefs>
 </ds:datastoreItem>
-</file>
-
-<file path=customXml/itemProps3.xml><?xml version="1.0" encoding="utf-8"?>
-<ds:datastoreItem xmlns:ds="http://schemas.openxmlformats.org/officeDocument/2006/customXml" ds:itemID="{746CFF6F-D9AA-4BC0-911A-0A1356771912}">
-  <ds:schemaRefs>
-    <ds:schemaRef ds:uri="http://schemas.microsoft.com/sharepoint/v3/contenttype/forms"/>
-  </ds:schemaRefs>
-</ds:datastoreItem>
 </file>
</xml_diff>